<commit_message>
fixed a typo in the example
</commit_message>
<xml_diff>
--- a/week07/Lecture07.pptx
+++ b/week07/Lecture07.pptx
@@ -214,7 +214,7 @@
           <a:p>
             <a:fld id="{634F3F22-B4BB-3F48-9180-464A9F2D66D1}" type="datetimeFigureOut">
               <a:rPr kumimoji="1" lang="zh-CN" altLang="en-US" smtClean="0"/>
-              <a:t>2022/10/27</a:t>
+              <a:t>2024/4/30</a:t>
             </a:fld>
             <a:endParaRPr kumimoji="1" lang="zh-CN" altLang="en-US"/>
           </a:p>
@@ -694,7 +694,7 @@
           <a:p>
             <a:fld id="{FC19A4FA-3D9A-4114-B0D5-759CBD56F1AB}" type="datetimeFigureOut">
               <a:rPr lang="zh-CN" altLang="en-US" smtClean="0"/>
-              <a:t>2022/10/27</a:t>
+              <a:t>2024/4/30</a:t>
             </a:fld>
             <a:endParaRPr lang="zh-CN" altLang="en-US"/>
           </a:p>
@@ -897,7 +897,7 @@
           <a:p>
             <a:fld id="{FC19A4FA-3D9A-4114-B0D5-759CBD56F1AB}" type="datetimeFigureOut">
               <a:rPr lang="zh-CN" altLang="en-US" smtClean="0"/>
-              <a:t>2022/10/27</a:t>
+              <a:t>2024/4/30</a:t>
             </a:fld>
             <a:endParaRPr lang="zh-CN" altLang="en-US"/>
           </a:p>
@@ -1075,7 +1075,7 @@
           <a:p>
             <a:fld id="{FC19A4FA-3D9A-4114-B0D5-759CBD56F1AB}" type="datetimeFigureOut">
               <a:rPr lang="zh-CN" altLang="en-US" smtClean="0"/>
-              <a:t>2022/10/27</a:t>
+              <a:t>2024/4/30</a:t>
             </a:fld>
             <a:endParaRPr lang="zh-CN" altLang="en-US"/>
           </a:p>
@@ -1299,7 +1299,7 @@
           <a:p>
             <a:fld id="{FC19A4FA-3D9A-4114-B0D5-759CBD56F1AB}" type="datetimeFigureOut">
               <a:rPr lang="zh-CN" altLang="en-US" smtClean="0"/>
-              <a:t>2022/10/27</a:t>
+              <a:t>2024/4/30</a:t>
             </a:fld>
             <a:endParaRPr lang="zh-CN" altLang="en-US"/>
           </a:p>
@@ -1533,7 +1533,7 @@
           <a:p>
             <a:fld id="{FC19A4FA-3D9A-4114-B0D5-759CBD56F1AB}" type="datetimeFigureOut">
               <a:rPr lang="zh-CN" altLang="en-US" smtClean="0"/>
-              <a:t>2022/10/27</a:t>
+              <a:t>2024/4/30</a:t>
             </a:fld>
             <a:endParaRPr lang="zh-CN" altLang="en-US"/>
           </a:p>
@@ -1932,7 +1932,7 @@
           <a:p>
             <a:fld id="{FC19A4FA-3D9A-4114-B0D5-759CBD56F1AB}" type="datetimeFigureOut">
               <a:rPr lang="zh-CN" altLang="en-US" smtClean="0"/>
-              <a:t>2022/10/27</a:t>
+              <a:t>2024/4/30</a:t>
             </a:fld>
             <a:endParaRPr lang="zh-CN" altLang="en-US"/>
           </a:p>
@@ -2212,7 +2212,7 @@
           <a:p>
             <a:fld id="{FC19A4FA-3D9A-4114-B0D5-759CBD56F1AB}" type="datetimeFigureOut">
               <a:rPr lang="zh-CN" altLang="en-US" smtClean="0"/>
-              <a:t>2022/10/27</a:t>
+              <a:t>2024/4/30</a:t>
             </a:fld>
             <a:endParaRPr lang="zh-CN" altLang="en-US"/>
           </a:p>
@@ -2364,7 +2364,7 @@
           <a:p>
             <a:fld id="{FC19A4FA-3D9A-4114-B0D5-759CBD56F1AB}" type="datetimeFigureOut">
               <a:rPr lang="zh-CN" altLang="en-US" smtClean="0"/>
-              <a:t>2022/10/27</a:t>
+              <a:t>2024/4/30</a:t>
             </a:fld>
             <a:endParaRPr lang="zh-CN" altLang="en-US"/>
           </a:p>
@@ -2494,7 +2494,7 @@
           <a:p>
             <a:fld id="{FC19A4FA-3D9A-4114-B0D5-759CBD56F1AB}" type="datetimeFigureOut">
               <a:rPr lang="zh-CN" altLang="en-US" smtClean="0"/>
-              <a:t>2022/10/27</a:t>
+              <a:t>2024/4/30</a:t>
             </a:fld>
             <a:endParaRPr lang="zh-CN" altLang="en-US"/>
           </a:p>
@@ -2804,7 +2804,7 @@
           <a:p>
             <a:fld id="{FC19A4FA-3D9A-4114-B0D5-759CBD56F1AB}" type="datetimeFigureOut">
               <a:rPr lang="zh-CN" altLang="en-US" smtClean="0"/>
-              <a:t>2022/10/27</a:t>
+              <a:t>2024/4/30</a:t>
             </a:fld>
             <a:endParaRPr lang="zh-CN" altLang="en-US"/>
           </a:p>
@@ -3091,7 +3091,7 @@
           <a:p>
             <a:fld id="{FC19A4FA-3D9A-4114-B0D5-759CBD56F1AB}" type="datetimeFigureOut">
               <a:rPr lang="zh-CN" altLang="en-US" smtClean="0"/>
-              <a:t>2022/10/27</a:t>
+              <a:t>2024/4/30</a:t>
             </a:fld>
             <a:endParaRPr lang="zh-CN" altLang="en-US"/>
           </a:p>
@@ -3384,7 +3384,7 @@
           <a:p>
             <a:fld id="{FC19A4FA-3D9A-4114-B0D5-759CBD56F1AB}" type="datetimeFigureOut">
               <a:rPr lang="zh-CN" altLang="en-US" smtClean="0"/>
-              <a:t>2022/10/27</a:t>
+              <a:t>2024/4/30</a:t>
             </a:fld>
             <a:endParaRPr lang="zh-CN" altLang="en-US"/>
           </a:p>
@@ -4159,7 +4159,7 @@
                 </a:solidFill>
                 <a:latin typeface="Menlo" panose="020B0609030804020204" pitchFamily="49" charset="0"/>
               </a:rPr>
-              <a:t>product</a:t>
+              <a:t>sum</a:t>
             </a:r>
             <a:r>
               <a:rPr lang="en" altLang="zh-CN" dirty="0">
@@ -4462,7 +4462,25 @@
                 </a:solidFill>
                 <a:latin typeface="Menlo" panose="020B0609030804020204" pitchFamily="49" charset="0"/>
               </a:rPr>
-              <a:t> * </a:t>
+              <a:t> </a:t>
+            </a:r>
+            <a:r>
+              <a:rPr lang="en-US" altLang="zh-CN" dirty="0">
+                <a:solidFill>
+                  <a:srgbClr val="000000"/>
+                </a:solidFill>
+                <a:latin typeface="Menlo" panose="020B0609030804020204" pitchFamily="49" charset="0"/>
+              </a:rPr>
+              <a:t>+</a:t>
+            </a:r>
+            <a:r>
+              <a:rPr lang="en" altLang="zh-CN" dirty="0">
+                <a:solidFill>
+                  <a:srgbClr val="000000"/>
+                </a:solidFill>
+                <a:latin typeface="Menlo" panose="020B0609030804020204" pitchFamily="49" charset="0"/>
+              </a:rPr>
+              <a:t> </a:t>
             </a:r>
             <a:r>
               <a:rPr lang="en" altLang="zh-CN" dirty="0">
@@ -4502,7 +4520,7 @@
                 </a:solidFill>
                 <a:latin typeface="Menlo" panose="020B0609030804020204" pitchFamily="49" charset="0"/>
               </a:rPr>
-              <a:t>// Implicitly instantiates product&lt;int&gt;(int, int)</a:t>
+              <a:t>// Implicitly instantiates sum&lt;int&gt;(int, int)</a:t>
             </a:r>
             <a:endParaRPr lang="en" altLang="zh-CN" dirty="0">
               <a:solidFill>
@@ -4591,7 +4609,7 @@
                 </a:solidFill>
                 <a:latin typeface="Menlo" panose="020B0609030804020204" pitchFamily="49" charset="0"/>
               </a:rPr>
-              <a:t>product</a:t>
+              <a:t>sum</a:t>
             </a:r>
             <a:r>
               <a:rPr lang="en" altLang="zh-CN" dirty="0">
@@ -4701,7 +4719,7 @@
                 </a:solidFill>
                 <a:latin typeface="Menlo" panose="020B0609030804020204" pitchFamily="49" charset="0"/>
               </a:rPr>
-              <a:t>// Implicitly instantiates product&lt;float&gt;(float, float)</a:t>
+              <a:t>// Implicitly instantiates sum&lt;float&gt;(float, float)</a:t>
             </a:r>
             <a:endParaRPr lang="en" altLang="zh-CN" dirty="0">
               <a:solidFill>
@@ -4790,7 +4808,7 @@
                 </a:solidFill>
                 <a:latin typeface="Menlo" panose="020B0609030804020204" pitchFamily="49" charset="0"/>
               </a:rPr>
-              <a:t>product</a:t>
+              <a:t>sum</a:t>
             </a:r>
             <a:r>
               <a:rPr lang="en" altLang="zh-CN" dirty="0">

</xml_diff>